<commit_message>
Atualização power Bi e ppt.
</commit_message>
<xml_diff>
--- a/Pag apresentação.pptx
+++ b/Pag apresentação.pptx
@@ -127,7 +127,7 @@
 <p1510:revInfo xmlns:a="http://schemas.openxmlformats.org/drawingml/2006/main" xmlns:r="http://schemas.openxmlformats.org/officeDocument/2006/relationships" xmlns:p1510="http://schemas.microsoft.com/office/powerpoint/2015/10/main">
   <p1510:revLst>
     <p1510:client id="{241663F2-E587-29E9-0CD4-E55E5B893816}" v="3" dt="2021-08-13T18:57:45.651"/>
-    <p1510:client id="{35E7CFD2-7AD2-3A05-6968-A057ED561726}" v="3" dt="2021-08-18T11:31:44.858"/>
+    <p1510:client id="{35E7CFD2-7AD2-3A05-6968-A057ED561726}" v="139" dt="2021-08-18T16:44:14.898"/>
     <p1510:client id="{AD87CF13-EA30-84B4-2814-60964BD61078}" v="4742" dt="2021-08-16T18:28:41.821"/>
     <p1510:client id="{C3BC8BE6-0986-C9C8-A619-97DBCC1AFF7D}" v="37" dt="2021-08-17T15:31:22.540"/>
     <p1510:client id="{F137F3EE-CB81-45A2-A73F-E24C2B5C6AA2}" v="21" dt="2021-08-11T18:13:15.530"/>
@@ -4466,7 +4466,7 @@
                 <a:ea typeface="+mn-lt"/>
                 <a:cs typeface="+mn-lt"/>
               </a:rPr>
-              <a:t>Db (dados brutos)</a:t>
+              <a:t>db (dados brutos)</a:t>
             </a:r>
             <a:endParaRPr lang="pt-BR" sz="1600" dirty="0">
               <a:solidFill>
@@ -4513,6 +4513,16 @@
               <a:buNone/>
             </a:pPr>
             <a:r>
+              <a:rPr lang="pt-BR" sz="2000">
+                <a:solidFill>
+                  <a:srgbClr val="FFFFFF"/>
+                </a:solidFill>
+                <a:ea typeface="+mn-lt"/>
+                <a:cs typeface="+mn-lt"/>
+              </a:rPr>
+              <a:t>2- Procedure para ingestão de </a:t>
+            </a:r>
+            <a:r>
               <a:rPr lang="pt-BR" sz="2000" dirty="0">
                 <a:solidFill>
                   <a:srgbClr val="FFFFFF"/>
@@ -4520,19 +4530,9 @@
                 <a:ea typeface="+mn-lt"/>
                 <a:cs typeface="+mn-lt"/>
               </a:rPr>
-              <a:t>2- Procedure para injestão de dados no </a:t>
+              <a:t>dados no schema analytic; </a:t>
             </a:r>
-            <a:r>
-              <a:rPr lang="pt-BR" sz="2000">
-                <a:solidFill>
-                  <a:srgbClr val="FFFFFF"/>
-                </a:solidFill>
-                <a:ea typeface="+mn-lt"/>
-                <a:cs typeface="+mn-lt"/>
-              </a:rPr>
-              <a:t>schema analytic; </a:t>
-            </a:r>
-            <a:endParaRPr lang="pt-BR">
+            <a:endParaRPr lang="pt-BR" dirty="0">
               <a:cs typeface="Calibri" panose="020F0502020204030204"/>
             </a:endParaRPr>
           </a:p>
@@ -5521,7 +5521,7 @@
                 <a:ea typeface="+mn-lt"/>
                 <a:cs typeface="+mn-lt"/>
               </a:rPr>
-              <a:t>Por fim, os dados foram carregados e tratados na </a:t>
+              <a:t>Por fim, os dados foram carregados e tratados na camada visual </a:t>
             </a:r>
             <a:r>
               <a:rPr lang="pt-BR" sz="2000">
@@ -5531,7 +5531,7 @@
                 <a:ea typeface="+mn-lt"/>
                 <a:cs typeface="+mn-lt"/>
               </a:rPr>
-              <a:t>camada visual para visualização e análise: </a:t>
+              <a:t>para análise: </a:t>
             </a:r>
             <a:endParaRPr lang="pt-BR"/>
           </a:p>
@@ -5599,10 +5599,10 @@
       </p:pic>
       <p:pic>
         <p:nvPicPr>
-          <p:cNvPr id="9" name="Imagem 18" descr="Gráfico&#10;&#10;Descrição gerada automaticamente">
+          <p:cNvPr id="5" name="Imagem 5" descr="Interface gráfica do usuário, Site&#10;&#10;Descrição gerada automaticamente">
             <a:extLst>
               <a:ext uri="{FF2B5EF4-FFF2-40B4-BE49-F238E27FC236}">
-                <a16:creationId xmlns:a16="http://schemas.microsoft.com/office/drawing/2014/main" id="{0C20035C-8BCB-464A-A1E8-66E521960F15}"/>
+                <a16:creationId xmlns:a16="http://schemas.microsoft.com/office/drawing/2014/main" id="{A11F766E-260E-4510-B7C2-279D00D90FD0}"/>
               </a:ext>
             </a:extLst>
           </p:cNvPr>
@@ -5619,8 +5619,8 @@
         </p:blipFill>
         <p:spPr>
           <a:xfrm>
-            <a:off x="5329445" y="1435021"/>
-            <a:ext cx="6423306" cy="3613778"/>
+            <a:off x="5235497" y="1148802"/>
+            <a:ext cx="6418032" cy="3616553"/>
           </a:xfrm>
           <a:prstGeom prst="rect">
             <a:avLst/>
@@ -5629,10 +5629,10 @@
       </p:pic>
       <p:pic>
         <p:nvPicPr>
-          <p:cNvPr id="10" name="Imagem 15" descr="Interface gráfica do usuário, Site&#10;&#10;Descrição gerada automaticamente">
+          <p:cNvPr id="6" name="Imagem 6" descr="Gráfico&#10;&#10;Descrição gerada automaticamente">
             <a:extLst>
               <a:ext uri="{FF2B5EF4-FFF2-40B4-BE49-F238E27FC236}">
-                <a16:creationId xmlns:a16="http://schemas.microsoft.com/office/drawing/2014/main" id="{6FB9E7FD-AB9B-47EB-9B45-FAA99FC02164}"/>
+                <a16:creationId xmlns:a16="http://schemas.microsoft.com/office/drawing/2014/main" id="{2B40826C-B45F-49EB-93A8-4CC2D7F3F480}"/>
               </a:ext>
             </a:extLst>
           </p:cNvPr>
@@ -5649,8 +5649,8 @@
         </p:blipFill>
         <p:spPr>
           <a:xfrm>
-            <a:off x="5832299" y="3185156"/>
-            <a:ext cx="6302503" cy="3546231"/>
+            <a:off x="5597913" y="2792335"/>
+            <a:ext cx="6469566" cy="3605793"/>
           </a:xfrm>
           <a:prstGeom prst="rect">
             <a:avLst/>
@@ -5795,7 +5795,7 @@
                                           </p:stCondLst>
                                         </p:cTn>
                                         <p:tgtEl>
-                                          <p:spTgt spid="9"/>
+                                          <p:spTgt spid="5"/>
                                         </p:tgtEl>
                                         <p:attrNameLst>
                                           <p:attrName>style.visibility</p:attrName>
@@ -5809,7 +5809,7 @@
                                       <p:cBhvr additive="base">
                                         <p:cTn id="13" dur="500" fill="hold"/>
                                         <p:tgtEl>
-                                          <p:spTgt spid="9"/>
+                                          <p:spTgt spid="5"/>
                                         </p:tgtEl>
                                         <p:attrNameLst>
                                           <p:attrName>ppt_x</p:attrName>
@@ -5832,7 +5832,7 @@
                                       <p:cBhvr additive="base">
                                         <p:cTn id="14" dur="500" fill="hold"/>
                                         <p:tgtEl>
-                                          <p:spTgt spid="9"/>
+                                          <p:spTgt spid="5"/>
                                         </p:tgtEl>
                                         <p:attrNameLst>
                                           <p:attrName>ppt_y</p:attrName>
@@ -5886,7 +5886,7 @@
                                           </p:stCondLst>
                                         </p:cTn>
                                         <p:tgtEl>
-                                          <p:spTgt spid="10"/>
+                                          <p:spTgt spid="6"/>
                                         </p:tgtEl>
                                         <p:attrNameLst>
                                           <p:attrName>style.visibility</p:attrName>
@@ -5900,7 +5900,7 @@
                                       <p:cBhvr additive="base">
                                         <p:cTn id="19" dur="500" fill="hold"/>
                                         <p:tgtEl>
-                                          <p:spTgt spid="10"/>
+                                          <p:spTgt spid="6"/>
                                         </p:tgtEl>
                                         <p:attrNameLst>
                                           <p:attrName>ppt_x</p:attrName>
@@ -5923,7 +5923,7 @@
                                       <p:cBhvr additive="base">
                                         <p:cTn id="20" dur="500" fill="hold"/>
                                         <p:tgtEl>
-                                          <p:spTgt spid="10"/>
+                                          <p:spTgt spid="6"/>
                                         </p:tgtEl>
                                         <p:attrNameLst>
                                           <p:attrName>ppt_y</p:attrName>
@@ -6445,15 +6445,98 @@
             <a:pPr algn="just"/>
             <a:r>
               <a:rPr lang="en-US" sz="2300" b="1" kern="1200">
-                <a:latin typeface="+mj-lt"/>
-                <a:ea typeface="+mj-ea"/>
-                <a:cs typeface="+mj-cs"/>
+                <a:ea typeface="+mj-lt"/>
+                <a:cs typeface="+mj-lt"/>
               </a:rPr>
-              <a:t>PagSeguro é uma empresa brasileira de pagamentos online que oferece diferentes tipos de maquininhas de cartão no Brasil. Além disso, a PagSeguro conta com o serviço de banco digital PagBank com rendimento superior ao da poupança.</a:t>
+              <a:t>PagSeguro é uma empresa brasileira de</a:t>
             </a:r>
-            <a:endParaRPr lang="pt-BR">
-              <a:ea typeface="+mj-ea"/>
-              <a:cs typeface="+mj-cs"/>
+            <a:r>
+              <a:rPr lang="en-US" sz="2300" b="1">
+                <a:ea typeface="+mj-lt"/>
+                <a:cs typeface="+mj-lt"/>
+              </a:rPr>
+              <a:t> </a:t>
+            </a:r>
+            <a:r>
+              <a:rPr lang="en-US" sz="2300" b="1" kern="1200">
+                <a:ea typeface="+mj-lt"/>
+                <a:cs typeface="+mj-lt"/>
+              </a:rPr>
+              <a:t>pagamentos online que oferece diferentes</a:t>
+            </a:r>
+            <a:r>
+              <a:rPr lang="en-US" sz="2300" b="1">
+                <a:ea typeface="+mj-lt"/>
+                <a:cs typeface="+mj-lt"/>
+              </a:rPr>
+              <a:t> </a:t>
+            </a:r>
+            <a:r>
+              <a:rPr lang="en-US" sz="2300" b="1" kern="1200">
+                <a:ea typeface="+mj-lt"/>
+                <a:cs typeface="+mj-lt"/>
+              </a:rPr>
+              <a:t>tipos de maquininhas de cartão no</a:t>
+            </a:r>
+            <a:r>
+              <a:rPr lang="en-US" sz="2300" b="1">
+                <a:ea typeface="+mj-lt"/>
+                <a:cs typeface="+mj-lt"/>
+              </a:rPr>
+              <a:t> </a:t>
+            </a:r>
+            <a:r>
+              <a:rPr lang="en-US" sz="2300" b="1" kern="1200">
+                <a:ea typeface="+mj-lt"/>
+                <a:cs typeface="+mj-lt"/>
+              </a:rPr>
+              <a:t>Brasil</a:t>
+            </a:r>
+            <a:r>
+              <a:rPr lang="en-US" sz="2300" b="1">
+                <a:ea typeface="+mj-lt"/>
+                <a:cs typeface="+mj-lt"/>
+              </a:rPr>
+              <a:t>, além </a:t>
+            </a:r>
+            <a:r>
+              <a:rPr lang="en-US" sz="2300" b="1" kern="1200">
+                <a:ea typeface="+mj-lt"/>
+                <a:cs typeface="+mj-lt"/>
+              </a:rPr>
+              <a:t>disso, a PagSeguro conta com o</a:t>
+            </a:r>
+            <a:r>
+              <a:rPr lang="en-US" sz="2300" b="1">
+                <a:ea typeface="+mj-lt"/>
+                <a:cs typeface="+mj-lt"/>
+              </a:rPr>
+              <a:t> </a:t>
+            </a:r>
+            <a:r>
+              <a:rPr lang="en-US" sz="2300" b="1" kern="1200">
+                <a:ea typeface="+mj-lt"/>
+                <a:cs typeface="+mj-lt"/>
+              </a:rPr>
+              <a:t>serviço de banco digital PagBank com</a:t>
+            </a:r>
+            <a:r>
+              <a:rPr lang="en-US" sz="2300" b="1">
+                <a:ea typeface="+mj-lt"/>
+                <a:cs typeface="+mj-lt"/>
+              </a:rPr>
+              <a:t> </a:t>
+            </a:r>
+            <a:r>
+              <a:rPr lang="en-US" sz="2300" b="1" kern="1200">
+                <a:ea typeface="+mj-lt"/>
+                <a:cs typeface="+mj-lt"/>
+              </a:rPr>
+              <a:t>rendimento superior ao da poupança.</a:t>
+            </a:r>
+            <a:endParaRPr lang="pt-BR" b="1">
+              <a:ea typeface="+mj-lt"/>
+              <a:cs typeface="+mj-lt"/>
             </a:endParaRPr>
           </a:p>
         </p:txBody>
@@ -9646,7 +9729,7 @@
                 </a:solidFill>
                 <a:cs typeface="Calibri"/>
               </a:rPr>
-              <a:t>Coletar dados fictícios da web. </a:t>
+              <a:t>Coletar dados fictícios da web (Kaggle). </a:t>
             </a:r>
             <a:endParaRPr lang="pt-BR" sz="2000" dirty="0">
               <a:solidFill>
@@ -10589,7 +10672,7 @@
                 <a:ea typeface="+mn-lt"/>
                 <a:cs typeface="+mn-lt"/>
               </a:rPr>
-              <a:t> os dados no banco de dados.</a:t>
+              <a:t> os dados em um banco de dados.</a:t>
             </a:r>
             <a:endParaRPr lang="pt-BR" sz="2000">
               <a:solidFill>
@@ -14125,111 +14208,33 @@
         </p:spPr>
         <p:txBody>
           <a:bodyPr anchor="t">
-            <a:normAutofit/>
+            <a:normAutofit fontScale="90000"/>
           </a:bodyPr>
           <a:lstStyle/>
           <a:p>
             <a:r>
-              <a:rPr lang="pt-BR" sz="4000" b="1">
-                <a:solidFill>
-                  <a:schemeClr val="bg1"/>
-                </a:solidFill>
-                <a:cs typeface="Calibri Light"/>
-              </a:rPr>
-              <a:t>Decisões a serem tomadas:</a:t>
-            </a:r>
-          </a:p>
-        </p:txBody>
-      </p:sp>
-      <p:sp>
-        <p:nvSpPr>
-          <p:cNvPr id="3" name="Espaço Reservado para Conteúdo 2">
-            <a:extLst>
-              <a:ext uri="{FF2B5EF4-FFF2-40B4-BE49-F238E27FC236}">
-                <a16:creationId xmlns:a16="http://schemas.microsoft.com/office/drawing/2014/main" id="{48DAFA45-A0A4-42EB-90E2-25DDBD84D49F}"/>
-              </a:ext>
-            </a:extLst>
-          </p:cNvPr>
-          <p:cNvSpPr>
-            <a:spLocks noGrp="1"/>
-          </p:cNvSpPr>
-          <p:nvPr>
-            <p:ph idx="1"/>
-          </p:nvPr>
-        </p:nvSpPr>
-        <p:spPr>
-          <a:xfrm>
-            <a:off x="838201" y="3146400"/>
-            <a:ext cx="4394200" cy="2454300"/>
-          </a:xfrm>
-        </p:spPr>
-        <p:txBody>
-          <a:bodyPr vert="horz" lIns="91440" tIns="45720" rIns="91440" bIns="45720" rtlCol="0">
-            <a:normAutofit/>
-          </a:bodyPr>
-          <a:lstStyle/>
-          <a:p>
-            <a:pPr>
-              <a:buNone/>
-            </a:pPr>
-            <a:r>
-              <a:rPr lang="pt-BR" sz="2400">
+              <a:rPr lang="pt-BR" sz="4000">
                 <a:solidFill>
                   <a:schemeClr val="bg1">
                     <a:alpha val="80000"/>
                   </a:schemeClr>
                 </a:solidFill>
-                <a:ea typeface="+mn-lt"/>
-                <a:cs typeface="+mn-lt"/>
+                <a:latin typeface="Calibri"/>
+                <a:cs typeface="Calibri"/>
               </a:rPr>
-              <a:t>Decidir como utilizar cada tecnologia para que o projeto se tornasse eficiente e funcional foi um dos maiores desafios!</a:t>
+              <a:t>Decidir como utilizar cada tecnologia para que o projeto se tornasse eficiente e funcional foi um dos maiores desafios!</a:t>
             </a:r>
-            <a:endParaRPr lang="pt-BR" sz="2400">
-              <a:solidFill>
-                <a:schemeClr val="bg1">
-                  <a:alpha val="80000"/>
-                </a:schemeClr>
-              </a:solidFill>
-              <a:cs typeface="Calibri" panose="020F0502020204030204"/>
+            <a:endParaRPr lang="pt-BR" sz="4000">
+              <a:ea typeface="+mj-lt"/>
+              <a:cs typeface="+mj-lt"/>
             </a:endParaRPr>
           </a:p>
           <a:p>
-            <a:pPr marL="0" indent="0">
-              <a:buNone/>
-            </a:pPr>
-            <a:endParaRPr lang="pt-BR" sz="2400">
+            <a:endParaRPr lang="pt-BR" sz="4000" b="1" dirty="0">
               <a:solidFill>
-                <a:schemeClr val="bg1">
-                  <a:alpha val="80000"/>
-                </a:schemeClr>
+                <a:schemeClr val="bg1"/>
               </a:solidFill>
-              <a:cs typeface="Calibri" panose="020F0502020204030204"/>
-            </a:endParaRPr>
-          </a:p>
-          <a:p>
-            <a:pPr marL="0" indent="0">
-              <a:buNone/>
-            </a:pPr>
-            <a:endParaRPr lang="pt-BR" sz="2400">
-              <a:solidFill>
-                <a:schemeClr val="bg1">
-                  <a:alpha val="80000"/>
-                </a:schemeClr>
-              </a:solidFill>
-              <a:cs typeface="Calibri" panose="020F0502020204030204"/>
-            </a:endParaRPr>
-          </a:p>
-          <a:p>
-            <a:pPr marL="0" indent="0">
-              <a:buNone/>
-            </a:pPr>
-            <a:endParaRPr lang="pt-BR" sz="2400">
-              <a:solidFill>
-                <a:schemeClr val="bg1">
-                  <a:alpha val="80000"/>
-                </a:schemeClr>
-              </a:solidFill>
-              <a:cs typeface="Calibri" panose="020F0502020204030204"/>
+              <a:cs typeface="Calibri Light"/>
             </a:endParaRPr>
           </a:p>
         </p:txBody>
@@ -19246,7 +19251,7 @@
                 <a:rPr lang="pt-BR" sz="1400">
                   <a:cs typeface="Calibri"/>
                 </a:rPr>
-                <a:t>Injestão de dados no banco.</a:t>
+                <a:t>Ingestão de dados no banco.</a:t>
               </a:r>
               <a:endParaRPr lang="pt-BR" sz="1400" dirty="0">
                 <a:cs typeface="Calibri"/>
@@ -21341,7 +21346,7 @@
                 <a:ea typeface="+mn-lt"/>
                 <a:cs typeface="+mn-lt"/>
               </a:rPr>
-              <a:t>3- Injestão de dados no banco.</a:t>
+              <a:t>3- Ingestão de dados no banco.</a:t>
             </a:r>
             <a:endParaRPr lang="pt-BR">
               <a:solidFill>
@@ -21404,8 +21409,8 @@
         </p:blipFill>
         <p:spPr>
           <a:xfrm>
-            <a:off x="4808034" y="333942"/>
-            <a:ext cx="7110760" cy="2984140"/>
+            <a:off x="5458521" y="73747"/>
+            <a:ext cx="5949175" cy="2500921"/>
           </a:xfrm>
           <a:prstGeom prst="rect">
             <a:avLst/>
@@ -21414,10 +21419,10 @@
       </p:pic>
       <p:pic>
         <p:nvPicPr>
-          <p:cNvPr id="14" name="Imagem 14" descr="Gráfico, Gráfico de cascata&#10;&#10;Descrição gerada automaticamente">
+          <p:cNvPr id="9" name="Imagem 9">
             <a:extLst>
               <a:ext uri="{FF2B5EF4-FFF2-40B4-BE49-F238E27FC236}">
-                <a16:creationId xmlns:a16="http://schemas.microsoft.com/office/drawing/2014/main" id="{16AEC216-F244-4FD2-831C-86780E8A15D2}"/>
+                <a16:creationId xmlns:a16="http://schemas.microsoft.com/office/drawing/2014/main" id="{708E301A-55FC-45AE-AC80-D4A86BCA1485}"/>
               </a:ext>
             </a:extLst>
           </p:cNvPr>
@@ -21434,8 +21439,8 @@
         </p:blipFill>
         <p:spPr>
           <a:xfrm>
-            <a:off x="4956716" y="5171442"/>
-            <a:ext cx="6906321" cy="1551752"/>
+            <a:off x="5412058" y="2772923"/>
+            <a:ext cx="5912004" cy="2222837"/>
           </a:xfrm>
           <a:prstGeom prst="rect">
             <a:avLst/>
@@ -21444,10 +21449,10 @@
       </p:pic>
       <p:pic>
         <p:nvPicPr>
-          <p:cNvPr id="15" name="Imagem 15" descr="Texto, chat ou mensagem de texto&#10;&#10;Descrição gerada automaticamente">
+          <p:cNvPr id="11" name="Imagem 11" descr="Uma imagem contendo Interface gráfica do usuário&#10;&#10;Descrição gerada automaticamente">
             <a:extLst>
               <a:ext uri="{FF2B5EF4-FFF2-40B4-BE49-F238E27FC236}">
-                <a16:creationId xmlns:a16="http://schemas.microsoft.com/office/drawing/2014/main" id="{3D2BE359-684E-4095-B548-16C2ADDCB6D1}"/>
+                <a16:creationId xmlns:a16="http://schemas.microsoft.com/office/drawing/2014/main" id="{DEEB7515-3468-4D4F-8BD7-1D1E2ACA3D88}"/>
               </a:ext>
             </a:extLst>
           </p:cNvPr>
@@ -21464,8 +21469,8 @@
         </p:blipFill>
         <p:spPr>
           <a:xfrm>
-            <a:off x="5793059" y="3462964"/>
-            <a:ext cx="5373029" cy="1604757"/>
+            <a:off x="4835912" y="5416292"/>
+            <a:ext cx="7194395" cy="829735"/>
           </a:xfrm>
           <a:prstGeom prst="rect">
             <a:avLst/>
@@ -21564,7 +21569,7 @@
                                           </p:stCondLst>
                                         </p:cTn>
                                         <p:tgtEl>
-                                          <p:spTgt spid="15"/>
+                                          <p:spTgt spid="9"/>
                                         </p:tgtEl>
                                         <p:attrNameLst>
                                           <p:attrName>style.visibility</p:attrName>
@@ -21609,7 +21614,7 @@
                                           </p:stCondLst>
                                         </p:cTn>
                                         <p:tgtEl>
-                                          <p:spTgt spid="14"/>
+                                          <p:spTgt spid="11"/>
                                         </p:tgtEl>
                                         <p:attrNameLst>
                                           <p:attrName>style.visibility</p:attrName>

</xml_diff>